<commit_message>
New page front-end page designs
</commit_message>
<xml_diff>
--- a/SLIDES/SiteDesign.pptx
+++ b/SLIDES/SiteDesign.pptx
@@ -261,7 +261,7 @@
           <a:p>
             <a:fld id="{19E2A0A9-8937-467D-8AD7-745938BD1BB0}" type="datetimeFigureOut">
               <a:rPr lang="en-GB" smtClean="0"/>
-              <a:t>24/11/2018</a:t>
+              <a:t>02/12/2018</a:t>
             </a:fld>
             <a:endParaRPr lang="en-GB"/>
           </a:p>
@@ -461,7 +461,7 @@
           <a:p>
             <a:fld id="{19E2A0A9-8937-467D-8AD7-745938BD1BB0}" type="datetimeFigureOut">
               <a:rPr lang="en-GB" smtClean="0"/>
-              <a:t>24/11/2018</a:t>
+              <a:t>02/12/2018</a:t>
             </a:fld>
             <a:endParaRPr lang="en-GB"/>
           </a:p>
@@ -671,7 +671,7 @@
           <a:p>
             <a:fld id="{19E2A0A9-8937-467D-8AD7-745938BD1BB0}" type="datetimeFigureOut">
               <a:rPr lang="en-GB" smtClean="0"/>
-              <a:t>24/11/2018</a:t>
+              <a:t>02/12/2018</a:t>
             </a:fld>
             <a:endParaRPr lang="en-GB"/>
           </a:p>
@@ -871,7 +871,7 @@
           <a:p>
             <a:fld id="{19E2A0A9-8937-467D-8AD7-745938BD1BB0}" type="datetimeFigureOut">
               <a:rPr lang="en-GB" smtClean="0"/>
-              <a:t>24/11/2018</a:t>
+              <a:t>02/12/2018</a:t>
             </a:fld>
             <a:endParaRPr lang="en-GB"/>
           </a:p>
@@ -1147,7 +1147,7 @@
           <a:p>
             <a:fld id="{19E2A0A9-8937-467D-8AD7-745938BD1BB0}" type="datetimeFigureOut">
               <a:rPr lang="en-GB" smtClean="0"/>
-              <a:t>24/11/2018</a:t>
+              <a:t>02/12/2018</a:t>
             </a:fld>
             <a:endParaRPr lang="en-GB"/>
           </a:p>
@@ -1415,7 +1415,7 @@
           <a:p>
             <a:fld id="{19E2A0A9-8937-467D-8AD7-745938BD1BB0}" type="datetimeFigureOut">
               <a:rPr lang="en-GB" smtClean="0"/>
-              <a:t>24/11/2018</a:t>
+              <a:t>02/12/2018</a:t>
             </a:fld>
             <a:endParaRPr lang="en-GB"/>
           </a:p>
@@ -1830,7 +1830,7 @@
           <a:p>
             <a:fld id="{19E2A0A9-8937-467D-8AD7-745938BD1BB0}" type="datetimeFigureOut">
               <a:rPr lang="en-GB" smtClean="0"/>
-              <a:t>24/11/2018</a:t>
+              <a:t>02/12/2018</a:t>
             </a:fld>
             <a:endParaRPr lang="en-GB"/>
           </a:p>
@@ -1972,7 +1972,7 @@
           <a:p>
             <a:fld id="{19E2A0A9-8937-467D-8AD7-745938BD1BB0}" type="datetimeFigureOut">
               <a:rPr lang="en-GB" smtClean="0"/>
-              <a:t>24/11/2018</a:t>
+              <a:t>02/12/2018</a:t>
             </a:fld>
             <a:endParaRPr lang="en-GB"/>
           </a:p>
@@ -2085,7 +2085,7 @@
           <a:p>
             <a:fld id="{19E2A0A9-8937-467D-8AD7-745938BD1BB0}" type="datetimeFigureOut">
               <a:rPr lang="en-GB" smtClean="0"/>
-              <a:t>24/11/2018</a:t>
+              <a:t>02/12/2018</a:t>
             </a:fld>
             <a:endParaRPr lang="en-GB"/>
           </a:p>
@@ -2398,7 +2398,7 @@
           <a:p>
             <a:fld id="{19E2A0A9-8937-467D-8AD7-745938BD1BB0}" type="datetimeFigureOut">
               <a:rPr lang="en-GB" smtClean="0"/>
-              <a:t>24/11/2018</a:t>
+              <a:t>02/12/2018</a:t>
             </a:fld>
             <a:endParaRPr lang="en-GB"/>
           </a:p>
@@ -2687,7 +2687,7 @@
           <a:p>
             <a:fld id="{19E2A0A9-8937-467D-8AD7-745938BD1BB0}" type="datetimeFigureOut">
               <a:rPr lang="en-GB" smtClean="0"/>
-              <a:t>24/11/2018</a:t>
+              <a:t>02/12/2018</a:t>
             </a:fld>
             <a:endParaRPr lang="en-GB"/>
           </a:p>
@@ -2930,7 +2930,7 @@
           <a:p>
             <a:fld id="{19E2A0A9-8937-467D-8AD7-745938BD1BB0}" type="datetimeFigureOut">
               <a:rPr lang="en-GB" smtClean="0"/>
-              <a:t>24/11/2018</a:t>
+              <a:t>02/12/2018</a:t>
             </a:fld>
             <a:endParaRPr lang="en-GB"/>
           </a:p>
@@ -3521,7 +3521,7 @@
             <a:avLst/>
           </a:prstGeom>
           <a:solidFill>
-            <a:schemeClr val="accent4">
+            <a:schemeClr val="accent3">
               <a:lumMod val="20000"/>
               <a:lumOff val="80000"/>
             </a:schemeClr>
@@ -3579,9 +3579,8 @@
             <a:avLst/>
           </a:prstGeom>
           <a:solidFill>
-            <a:schemeClr val="accent4">
-              <a:lumMod val="20000"/>
-              <a:lumOff val="80000"/>
+            <a:schemeClr val="bg1">
+              <a:lumMod val="95000"/>
             </a:schemeClr>
           </a:solidFill>
           <a:ln>

</xml_diff>